<commit_message>
Präsentation Technisches Konzept Version 2
</commit_message>
<xml_diff>
--- a/Präsentation/Zwischenpräsentation_TechnischesKonzept.pptx
+++ b/Präsentation/Zwischenpräsentation_TechnischesKonzept.pptx
@@ -12,9 +12,9 @@
     <p:sldId id="462" r:id="rId3"/>
     <p:sldId id="473" r:id="rId4"/>
     <p:sldId id="472" r:id="rId5"/>
-    <p:sldId id="470" r:id="rId6"/>
-    <p:sldId id="468" r:id="rId7"/>
-    <p:sldId id="471" r:id="rId8"/>
+    <p:sldId id="471" r:id="rId6"/>
+    <p:sldId id="470" r:id="rId7"/>
+    <p:sldId id="468" r:id="rId8"/>
     <p:sldId id="469" r:id="rId9"/>
     <p:sldId id="474" r:id="rId10"/>
     <p:sldId id="475" r:id="rId11"/>
@@ -1340,7 +1340,7 @@
     </p:spTree>
     <p:extLst>
       <p:ext uri="{BB962C8B-B14F-4D97-AF65-F5344CB8AC3E}">
-        <p14:creationId xmlns:p14="http://schemas.microsoft.com/office/powerpoint/2010/main" val="2551397985"/>
+        <p14:creationId xmlns:p14="http://schemas.microsoft.com/office/powerpoint/2010/main" val="3701212405"/>
       </p:ext>
     </p:extLst>
   </p:cSld>
@@ -1434,7 +1434,7 @@
     </p:spTree>
     <p:extLst>
       <p:ext uri="{BB962C8B-B14F-4D97-AF65-F5344CB8AC3E}">
-        <p14:creationId xmlns:p14="http://schemas.microsoft.com/office/powerpoint/2010/main" val="168451790"/>
+        <p14:creationId xmlns:p14="http://schemas.microsoft.com/office/powerpoint/2010/main" val="2551397985"/>
       </p:ext>
     </p:extLst>
   </p:cSld>
@@ -1528,7 +1528,7 @@
     </p:spTree>
     <p:extLst>
       <p:ext uri="{BB962C8B-B14F-4D97-AF65-F5344CB8AC3E}">
-        <p14:creationId xmlns:p14="http://schemas.microsoft.com/office/powerpoint/2010/main" val="3701212405"/>
+        <p14:creationId xmlns:p14="http://schemas.microsoft.com/office/powerpoint/2010/main" val="168451790"/>
       </p:ext>
     </p:extLst>
   </p:cSld>
@@ -6300,7 +6300,52 @@
               <a:buFont typeface="Arial" panose="020B0604020202020204" pitchFamily="34" charset="0"/>
               <a:buChar char="•"/>
             </a:pPr>
+            <a:r>
+              <a:rPr lang="de-DE" dirty="0"/>
+              <a:t>Abbruchfunktion</a:t>
+            </a:r>
+          </a:p>
+          <a:p>
+            <a:pPr marL="285750" indent="-285750">
+              <a:buFont typeface="Arial" panose="020B0604020202020204" pitchFamily="34" charset="0"/>
+              <a:buChar char="•"/>
+            </a:pPr>
             <a:endParaRPr lang="de-DE" dirty="0"/>
+          </a:p>
+          <a:p>
+            <a:pPr marL="285750" indent="-285750">
+              <a:buFont typeface="Arial" panose="020B0604020202020204" pitchFamily="34" charset="0"/>
+              <a:buChar char="•"/>
+            </a:pPr>
+            <a:r>
+              <a:rPr lang="de-DE" dirty="0"/>
+              <a:t>Favoriten festlegen</a:t>
+            </a:r>
+          </a:p>
+          <a:p>
+            <a:pPr marL="285750" indent="-285750">
+              <a:buFont typeface="Arial" panose="020B0604020202020204" pitchFamily="34" charset="0"/>
+              <a:buChar char="•"/>
+            </a:pPr>
+            <a:endParaRPr lang="de-DE" dirty="0"/>
+          </a:p>
+          <a:p>
+            <a:pPr marL="285750" indent="-285750">
+              <a:buFont typeface="Arial" panose="020B0604020202020204" pitchFamily="34" charset="0"/>
+              <a:buChar char="•"/>
+            </a:pPr>
+            <a:r>
+              <a:rPr lang="de-DE" dirty="0"/>
+              <a:t>Nachrichten ohne vorherige </a:t>
+            </a:r>
+            <a:r>
+              <a:rPr lang="de-DE" dirty="0" err="1"/>
+              <a:t>Notification</a:t>
+            </a:r>
+            <a:r>
+              <a:rPr lang="de-DE" dirty="0"/>
+              <a:t> schreiben</a:t>
+            </a:r>
           </a:p>
         </p:txBody>
       </p:sp>
@@ -6424,7 +6469,7 @@
             </a:pPr>
             <a:r>
               <a:rPr lang="de-DE" dirty="0"/>
-              <a:t>Demo aktuelle Version</a:t>
+              <a:t>Ablaufdiagramm</a:t>
             </a:r>
           </a:p>
           <a:p>
@@ -6441,7 +6486,7 @@
             </a:pPr>
             <a:r>
               <a:rPr lang="de-DE" dirty="0"/>
-              <a:t>App-Design</a:t>
+              <a:t>Demo aktuelle Version</a:t>
             </a:r>
           </a:p>
           <a:p>
@@ -6458,7 +6503,7 @@
             </a:pPr>
             <a:r>
               <a:rPr lang="de-DE" dirty="0"/>
-              <a:t>Ablaufdiagramm</a:t>
+              <a:t>App-Design</a:t>
             </a:r>
           </a:p>
           <a:p>
@@ -6650,6 +6695,23 @@
             <a:r>
               <a:rPr lang="de-DE" dirty="0"/>
               <a:t>Integrierter Lernprozess</a:t>
+            </a:r>
+          </a:p>
+          <a:p>
+            <a:pPr>
+              <a:buFont typeface="Arial" panose="020B0604020202020204" pitchFamily="34" charset="0"/>
+              <a:buChar char="•"/>
+            </a:pPr>
+            <a:endParaRPr lang="de-DE" dirty="0"/>
+          </a:p>
+          <a:p>
+            <a:pPr>
+              <a:buFont typeface="Arial" panose="020B0604020202020204" pitchFamily="34" charset="0"/>
+              <a:buChar char="•"/>
+            </a:pPr>
+            <a:r>
+              <a:rPr lang="de-DE" dirty="0"/>
+              <a:t>Manuelle Navigation möglich</a:t>
             </a:r>
           </a:p>
         </p:txBody>
@@ -6838,6 +6900,45 @@
             </a:r>
           </a:p>
           <a:p>
+            <a:pPr marL="457200" lvl="1" indent="0">
+              <a:buNone/>
+            </a:pPr>
+            <a:r>
+              <a:rPr lang="de-DE" dirty="0"/>
+              <a:t>Oder</a:t>
+            </a:r>
+          </a:p>
+          <a:p>
+            <a:pPr lvl="1">
+              <a:buFont typeface="Arial" panose="020B0604020202020204" pitchFamily="34" charset="0"/>
+              <a:buChar char="•"/>
+            </a:pPr>
+            <a:r>
+              <a:rPr lang="de-DE" dirty="0"/>
+              <a:t>Liest „Nachrichten von &lt;Name1&gt;, &lt;Name2&gt;, &lt;Name3&gt;“ vor</a:t>
+            </a:r>
+          </a:p>
+          <a:p>
+            <a:pPr lvl="1">
+              <a:buFont typeface="Arial" panose="020B0604020202020204" pitchFamily="34" charset="0"/>
+              <a:buChar char="•"/>
+            </a:pPr>
+            <a:r>
+              <a:rPr lang="de-DE" dirty="0"/>
+              <a:t>Nutzer kann Schlüsselwort und den Namen nennen</a:t>
+            </a:r>
+          </a:p>
+          <a:p>
+            <a:pPr lvl="1">
+              <a:buFont typeface="Arial" panose="020B0604020202020204" pitchFamily="34" charset="0"/>
+              <a:buChar char="•"/>
+            </a:pPr>
+            <a:r>
+              <a:rPr lang="de-DE" dirty="0"/>
+              <a:t>Liest Nachricht von genanntem Namen vor</a:t>
+            </a:r>
+          </a:p>
+          <a:p>
             <a:pPr>
               <a:buFont typeface="Arial" panose="020B0604020202020204" pitchFamily="34" charset="0"/>
               <a:buChar char="•"/>
@@ -6953,32 +7054,32 @@
           <a:p>
             <a:r>
               <a:rPr lang="de-DE" dirty="0"/>
-              <a:t>Demo aktuelle Version</a:t>
-            </a:r>
-          </a:p>
-        </p:txBody>
-      </p:sp>
-      <p:sp>
-        <p:nvSpPr>
-          <p:cNvPr id="464901" name="Rectangle 5"/>
-          <p:cNvSpPr>
-            <a:spLocks noGrp="1" noChangeArrowheads="1"/>
-          </p:cNvSpPr>
-          <p:nvPr>
-            <p:ph type="body" idx="1"/>
-          </p:nvPr>
-        </p:nvSpPr>
-        <p:spPr>
-          <a:xfrm>
-            <a:off x="809625" y="1752600"/>
-            <a:ext cx="7543800" cy="4556720"/>
-          </a:xfrm>
-        </p:spPr>
+              <a:t>Ablaufdiagramm</a:t>
+            </a:r>
+          </a:p>
+        </p:txBody>
+      </p:sp>
+      <p:sp>
+        <p:nvSpPr>
+          <p:cNvPr id="3" name="Inhaltsplatzhalter 2">
+            <a:extLst>
+              <a:ext uri="{FF2B5EF4-FFF2-40B4-BE49-F238E27FC236}">
+                <a16:creationId xmlns:a16="http://schemas.microsoft.com/office/drawing/2014/main" id="{A3241813-2EFA-4C53-B150-B13B3E511309}"/>
+              </a:ext>
+            </a:extLst>
+          </p:cNvPr>
+          <p:cNvSpPr>
+            <a:spLocks noGrp="1"/>
+          </p:cNvSpPr>
+          <p:nvPr>
+            <p:ph idx="1"/>
+          </p:nvPr>
+        </p:nvSpPr>
+        <p:spPr/>
         <p:txBody>
           <a:bodyPr/>
           <a:lstStyle/>
           <a:p>
-            <a:pPr marL="0" indent="0"/>
             <a:endParaRPr lang="de-DE" dirty="0"/>
           </a:p>
         </p:txBody>
@@ -6986,7 +7087,7 @@
     </p:spTree>
     <p:extLst>
       <p:ext uri="{BB962C8B-B14F-4D97-AF65-F5344CB8AC3E}">
-        <p14:creationId xmlns:p14="http://schemas.microsoft.com/office/powerpoint/2010/main" val="2792013861"/>
+        <p14:creationId xmlns:p14="http://schemas.microsoft.com/office/powerpoint/2010/main" val="3571531620"/>
       </p:ext>
     </p:extLst>
   </p:cSld>
@@ -7038,6 +7139,91 @@
           <a:p>
             <a:r>
               <a:rPr lang="de-DE" dirty="0"/>
+              <a:t>Demo aktuelle Version</a:t>
+            </a:r>
+          </a:p>
+        </p:txBody>
+      </p:sp>
+      <p:sp>
+        <p:nvSpPr>
+          <p:cNvPr id="464901" name="Rectangle 5"/>
+          <p:cNvSpPr>
+            <a:spLocks noGrp="1" noChangeArrowheads="1"/>
+          </p:cNvSpPr>
+          <p:nvPr>
+            <p:ph type="body" idx="1"/>
+          </p:nvPr>
+        </p:nvSpPr>
+        <p:spPr>
+          <a:xfrm>
+            <a:off x="809625" y="1752600"/>
+            <a:ext cx="7543800" cy="4556720"/>
+          </a:xfrm>
+        </p:spPr>
+        <p:txBody>
+          <a:bodyPr/>
+          <a:lstStyle/>
+          <a:p>
+            <a:pPr marL="0" indent="0"/>
+            <a:endParaRPr lang="de-DE" dirty="0"/>
+          </a:p>
+        </p:txBody>
+      </p:sp>
+    </p:spTree>
+    <p:extLst>
+      <p:ext uri="{BB962C8B-B14F-4D97-AF65-F5344CB8AC3E}">
+        <p14:creationId xmlns:p14="http://schemas.microsoft.com/office/powerpoint/2010/main" val="2792013861"/>
+      </p:ext>
+    </p:extLst>
+  </p:cSld>
+  <p:clrMapOvr>
+    <a:masterClrMapping/>
+  </p:clrMapOvr>
+  <mc:AlternateContent xmlns:mc="http://schemas.openxmlformats.org/markup-compatibility/2006" xmlns:p14="http://schemas.microsoft.com/office/powerpoint/2010/main">
+    <mc:Choice Requires="p14">
+      <p:transition p14:dur="0"/>
+    </mc:Choice>
+    <mc:Fallback xmlns="">
+      <p:transition/>
+    </mc:Fallback>
+  </mc:AlternateContent>
+</p:sld>
+</file>
+
+<file path=ppt/slides/slide7.xml><?xml version="1.0" encoding="utf-8"?>
+<p:sld xmlns:a="http://schemas.openxmlformats.org/drawingml/2006/main" xmlns:r="http://schemas.openxmlformats.org/officeDocument/2006/relationships" xmlns:p="http://schemas.openxmlformats.org/presentationml/2006/main">
+  <p:cSld>
+    <p:spTree>
+      <p:nvGrpSpPr>
+        <p:cNvPr id="1" name=""/>
+        <p:cNvGrpSpPr/>
+        <p:nvPr/>
+      </p:nvGrpSpPr>
+      <p:grpSpPr>
+        <a:xfrm>
+          <a:off x="0" y="0"/>
+          <a:ext cx="0" cy="0"/>
+          <a:chOff x="0" y="0"/>
+          <a:chExt cx="0" cy="0"/>
+        </a:xfrm>
+      </p:grpSpPr>
+      <p:sp>
+        <p:nvSpPr>
+          <p:cNvPr id="464900" name="Rectangle 4"/>
+          <p:cNvSpPr>
+            <a:spLocks noGrp="1" noChangeArrowheads="1"/>
+          </p:cNvSpPr>
+          <p:nvPr>
+            <p:ph type="title"/>
+          </p:nvPr>
+        </p:nvSpPr>
+        <p:spPr/>
+        <p:txBody>
+          <a:bodyPr/>
+          <a:lstStyle/>
+          <a:p>
+            <a:r>
+              <a:rPr lang="de-DE" dirty="0"/>
               <a:t>App-Design</a:t>
             </a:r>
           </a:p>
@@ -7079,7 +7265,7 @@
       </p:pic>
       <p:pic>
         <p:nvPicPr>
-          <p:cNvPr id="17" name="Grafik 16" descr="Ein Bild, das Screenshot, Vogel enthält.&#10;&#10;Automatisch generierte Beschreibung">
+          <p:cNvPr id="17" name="Grafik 16">
             <a:extLst>
               <a:ext uri="{FF2B5EF4-FFF2-40B4-BE49-F238E27FC236}">
                 <a16:creationId xmlns:a16="http://schemas.microsoft.com/office/drawing/2014/main" id="{76CCEE75-487D-48F7-BED3-06C4CF9DB939}"/>
@@ -7093,14 +7279,13 @@
         </p:nvPicPr>
         <p:blipFill>
           <a:blip r:embed="rId4"/>
-          <a:stretch>
-            <a:fillRect/>
-          </a:stretch>
+          <a:srcRect/>
+          <a:stretch/>
         </p:blipFill>
         <p:spPr>
           <a:xfrm>
             <a:off x="2482884" y="1640731"/>
-            <a:ext cx="2010083" cy="3573481"/>
+            <a:ext cx="2010083" cy="3573480"/>
           </a:xfrm>
           <a:prstGeom prst="rect">
             <a:avLst/>
@@ -7186,91 +7371,6 @@
     <p:extLst>
       <p:ext uri="{BB962C8B-B14F-4D97-AF65-F5344CB8AC3E}">
         <p14:creationId xmlns:p14="http://schemas.microsoft.com/office/powerpoint/2010/main" val="2901394374"/>
-      </p:ext>
-    </p:extLst>
-  </p:cSld>
-  <p:clrMapOvr>
-    <a:masterClrMapping/>
-  </p:clrMapOvr>
-  <mc:AlternateContent xmlns:mc="http://schemas.openxmlformats.org/markup-compatibility/2006" xmlns:p14="http://schemas.microsoft.com/office/powerpoint/2010/main">
-    <mc:Choice Requires="p14">
-      <p:transition p14:dur="0"/>
-    </mc:Choice>
-    <mc:Fallback xmlns="">
-      <p:transition/>
-    </mc:Fallback>
-  </mc:AlternateContent>
-</p:sld>
-</file>
-
-<file path=ppt/slides/slide7.xml><?xml version="1.0" encoding="utf-8"?>
-<p:sld xmlns:a="http://schemas.openxmlformats.org/drawingml/2006/main" xmlns:r="http://schemas.openxmlformats.org/officeDocument/2006/relationships" xmlns:p="http://schemas.openxmlformats.org/presentationml/2006/main">
-  <p:cSld>
-    <p:spTree>
-      <p:nvGrpSpPr>
-        <p:cNvPr id="1" name=""/>
-        <p:cNvGrpSpPr/>
-        <p:nvPr/>
-      </p:nvGrpSpPr>
-      <p:grpSpPr>
-        <a:xfrm>
-          <a:off x="0" y="0"/>
-          <a:ext cx="0" cy="0"/>
-          <a:chOff x="0" y="0"/>
-          <a:chExt cx="0" cy="0"/>
-        </a:xfrm>
-      </p:grpSpPr>
-      <p:sp>
-        <p:nvSpPr>
-          <p:cNvPr id="464900" name="Rectangle 4"/>
-          <p:cNvSpPr>
-            <a:spLocks noGrp="1" noChangeArrowheads="1"/>
-          </p:cNvSpPr>
-          <p:nvPr>
-            <p:ph type="title"/>
-          </p:nvPr>
-        </p:nvSpPr>
-        <p:spPr/>
-        <p:txBody>
-          <a:bodyPr/>
-          <a:lstStyle/>
-          <a:p>
-            <a:r>
-              <a:rPr lang="de-DE" dirty="0"/>
-              <a:t>Ablaufdiagramm</a:t>
-            </a:r>
-          </a:p>
-        </p:txBody>
-      </p:sp>
-      <p:sp>
-        <p:nvSpPr>
-          <p:cNvPr id="3" name="Inhaltsplatzhalter 2">
-            <a:extLst>
-              <a:ext uri="{FF2B5EF4-FFF2-40B4-BE49-F238E27FC236}">
-                <a16:creationId xmlns:a16="http://schemas.microsoft.com/office/drawing/2014/main" id="{A3241813-2EFA-4C53-B150-B13B3E511309}"/>
-              </a:ext>
-            </a:extLst>
-          </p:cNvPr>
-          <p:cNvSpPr>
-            <a:spLocks noGrp="1"/>
-          </p:cNvSpPr>
-          <p:nvPr>
-            <p:ph idx="1"/>
-          </p:nvPr>
-        </p:nvSpPr>
-        <p:spPr/>
-        <p:txBody>
-          <a:bodyPr/>
-          <a:lstStyle/>
-          <a:p>
-            <a:endParaRPr lang="de-DE" dirty="0"/>
-          </a:p>
-        </p:txBody>
-      </p:sp>
-    </p:spTree>
-    <p:extLst>
-      <p:ext uri="{BB962C8B-B14F-4D97-AF65-F5344CB8AC3E}">
-        <p14:creationId xmlns:p14="http://schemas.microsoft.com/office/powerpoint/2010/main" val="3571531620"/>
       </p:ext>
     </p:extLst>
   </p:cSld>

</xml_diff>